<commit_message>
lps and slides 3-22
</commit_message>
<xml_diff>
--- a/old/precal2_6_03.pptx
+++ b/old/precal2_6_03.pptx
@@ -15,9 +15,6 @@
     <p:sldId id="260" r:id="rId12"/>
     <p:sldId id="261" r:id="rId13"/>
     <p:sldId id="262" r:id="rId14"/>
-    <p:sldId id="263" r:id="rId15"/>
-    <p:sldId id="264" r:id="rId16"/>
-    <p:sldId id="265" r:id="rId17"/>
   </p:sldIdLst>
   <p:sldSz cx="9144000" cy="5143500"/>
   <p:notesSz cx="6858000" cy="9144000"/>
@@ -701,158 +698,6 @@
             </a:pPr>
             <a:r>
               <a:t>This will be identical to B except taht the elements of the first row will be X2</a:t>
-            </a:r>
-          </a:p>
-        </p:txBody>
-      </p:sp>
-    </p:spTree>
-  </p:cSld>
-  <p:clrMapOvr>
-    <a:masterClrMapping/>
-  </p:clrMapOvr>
-</p:notes>
-</file>
-
-<file path=ppt/notesSlides/notesSlide4.xml><?xml version="1.0" encoding="utf-8"?>
-<p:notes xmlns:a="http://schemas.openxmlformats.org/drawingml/2006/main" xmlns:r="http://schemas.openxmlformats.org/officeDocument/2006/relationships" xmlns:p="http://schemas.openxmlformats.org/presentationml/2006/main" xmlns:m="http://schemas.openxmlformats.org/officeDocument/2006/math" xmlns:a14="http://schemas.microsoft.com/office/drawing/2010/main" showMasterSp="1" showMasterPhAnim="1">
-  <p:cSld>
-    <p:spTree>
-      <p:nvGrpSpPr>
-        <p:cNvPr id="1" name=""/>
-        <p:cNvGrpSpPr/>
-        <p:nvPr/>
-      </p:nvGrpSpPr>
-      <p:grpSpPr>
-        <a:xfrm>
-          <a:off x="0" y="0"/>
-          <a:ext cx="0" cy="0"/>
-          <a:chOff x="0" y="0"/>
-          <a:chExt cx="0" cy="0"/>
-        </a:xfrm>
-      </p:grpSpPr>
-      <p:sp>
-        <p:nvSpPr>
-          <p:cNvPr id="218" name="Shape 218"/>
-          <p:cNvSpPr/>
-          <p:nvPr>
-            <p:ph type="sldImg"/>
-          </p:nvPr>
-        </p:nvSpPr>
-        <p:spPr>
-          <a:prstGeom prst="rect">
-            <a:avLst/>
-          </a:prstGeom>
-        </p:spPr>
-        <p:txBody>
-          <a:bodyPr/>
-          <a:lstStyle/>
-          <a:p>
-            <a:pPr/>
-          </a:p>
-        </p:txBody>
-      </p:sp>
-      <p:sp>
-        <p:nvSpPr>
-          <p:cNvPr id="219" name="Shape 219"/>
-          <p:cNvSpPr/>
-          <p:nvPr>
-            <p:ph type="body" sz="quarter" idx="1"/>
-          </p:nvPr>
-        </p:nvSpPr>
-        <p:spPr>
-          <a:prstGeom prst="rect">
-            <a:avLst/>
-          </a:prstGeom>
-        </p:spPr>
-        <p:txBody>
-          <a:bodyPr/>
-          <a:lstStyle/>
-          <a:p>
-            <a:pPr/>
-            <a:r>
-              <a:t>Why Can these matrices be multiplied? Because A has 3 columns and B 3 rows.</a:t>
-            </a:r>
-          </a:p>
-          <a:p>
-            <a:pPr/>
-            <a:r>
-              <a:t>What do you notice about the product of A and B? It’s identical to B.</a:t>
-            </a:r>
-          </a:p>
-          <a:p>
-            <a:pPr/>
-            <a:r>
-              <a:t>Do you think the order of operations matter here (ie does AB=BA?) no the output will be B no ,after what.</a:t>
-            </a:r>
-          </a:p>
-        </p:txBody>
-      </p:sp>
-    </p:spTree>
-  </p:cSld>
-  <p:clrMapOvr>
-    <a:masterClrMapping/>
-  </p:clrMapOvr>
-</p:notes>
-</file>
-
-<file path=ppt/notesSlides/notesSlide5.xml><?xml version="1.0" encoding="utf-8"?>
-<p:notes xmlns:a="http://schemas.openxmlformats.org/drawingml/2006/main" xmlns:r="http://schemas.openxmlformats.org/officeDocument/2006/relationships" xmlns:p="http://schemas.openxmlformats.org/presentationml/2006/main" xmlns:m="http://schemas.openxmlformats.org/officeDocument/2006/math" xmlns:a14="http://schemas.microsoft.com/office/drawing/2010/main" showMasterSp="1" showMasterPhAnim="1">
-  <p:cSld>
-    <p:spTree>
-      <p:nvGrpSpPr>
-        <p:cNvPr id="1" name=""/>
-        <p:cNvGrpSpPr/>
-        <p:nvPr/>
-      </p:nvGrpSpPr>
-      <p:grpSpPr>
-        <a:xfrm>
-          <a:off x="0" y="0"/>
-          <a:ext cx="0" cy="0"/>
-          <a:chOff x="0" y="0"/>
-          <a:chExt cx="0" cy="0"/>
-        </a:xfrm>
-      </p:grpSpPr>
-      <p:sp>
-        <p:nvSpPr>
-          <p:cNvPr id="224" name="Shape 224"/>
-          <p:cNvSpPr/>
-          <p:nvPr>
-            <p:ph type="sldImg"/>
-          </p:nvPr>
-        </p:nvSpPr>
-        <p:spPr>
-          <a:prstGeom prst="rect">
-            <a:avLst/>
-          </a:prstGeom>
-        </p:spPr>
-        <p:txBody>
-          <a:bodyPr/>
-          <a:lstStyle/>
-          <a:p>
-            <a:pPr/>
-          </a:p>
-        </p:txBody>
-      </p:sp>
-      <p:sp>
-        <p:nvSpPr>
-          <p:cNvPr id="225" name="Shape 225"/>
-          <p:cNvSpPr/>
-          <p:nvPr>
-            <p:ph type="body" sz="quarter" idx="1"/>
-          </p:nvPr>
-        </p:nvSpPr>
-        <p:spPr>
-          <a:prstGeom prst="rect">
-            <a:avLst/>
-          </a:prstGeom>
-        </p:spPr>
-        <p:txBody>
-          <a:bodyPr/>
-          <a:lstStyle/>
-          <a:p>
-            <a:pPr/>
-            <a:r>
-              <a:t>Coefficient matrix A times variable matrix x equals the left hand side of the equation. Matrices are only equal if each element of one matrix is equal to the corresponding element of the other.</a:t>
             </a:r>
           </a:p>
         </p:txBody>
@@ -5516,310 +5361,6 @@
 </p:sld>
 </file>
 
-<file path=ppt/slides/slide10.xml><?xml version="1.0" encoding="utf-8"?>
-<p:sld xmlns:a="http://schemas.openxmlformats.org/drawingml/2006/main" xmlns:r="http://schemas.openxmlformats.org/officeDocument/2006/relationships" xmlns:p="http://schemas.openxmlformats.org/presentationml/2006/main" xmlns:m="http://schemas.openxmlformats.org/officeDocument/2006/math" xmlns:a14="http://schemas.microsoft.com/office/drawing/2010/main" showMasterSp="1" showMasterPhAnim="1">
-  <p:cSld>
-    <p:spTree>
-      <p:nvGrpSpPr>
-        <p:cNvPr id="1" name=""/>
-        <p:cNvGrpSpPr/>
-        <p:nvPr/>
-      </p:nvGrpSpPr>
-      <p:grpSpPr>
-        <a:xfrm>
-          <a:off x="0" y="0"/>
-          <a:ext cx="0" cy="0"/>
-          <a:chOff x="0" y="0"/>
-          <a:chExt cx="0" cy="0"/>
-        </a:xfrm>
-      </p:grpSpPr>
-      <p:sp>
-        <p:nvSpPr>
-          <p:cNvPr id="231" name="Google Shape;119;p19"/>
-          <p:cNvSpPr txBox="1"/>
-          <p:nvPr/>
-        </p:nvSpPr>
-        <p:spPr>
-          <a:xfrm>
-            <a:off x="2463308" y="1404067"/>
-            <a:ext cx="10603771" cy="2452971"/>
-          </a:xfrm>
-          <a:prstGeom prst="rect">
-            <a:avLst/>
-          </a:prstGeom>
-          <a:ln w="12700">
-            <a:miter lim="400000"/>
-          </a:ln>
-          <a:extLst>
-            <a:ext uri="{C572A759-6A51-4108-AA02-DFA0A04FC94B}">
-              <ma14:wrappingTextBoxFlag xmlns:ma14="http://schemas.microsoft.com/office/mac/drawingml/2011/main" val="1"/>
-            </a:ext>
-          </a:extLst>
-        </p:spPr>
-        <p:txBody>
-          <a:bodyPr lIns="243799" tIns="243799" rIns="243799" bIns="243799">
-            <a:normAutofit fontScale="100000" lnSpcReduction="0"/>
-          </a:bodyPr>
-          <a:lstStyle/>
-          <a:p>
-            <a:pPr marL="629708" indent="-629708" defTabSz="2438400">
-              <a:lnSpc>
-                <a:spcPct val="115000"/>
-              </a:lnSpc>
-              <a:buSzPct val="100000"/>
-              <a:buAutoNum type="arabicPeriod" startAt="1"/>
-              <a:defRPr sz="1800">
-                <a:solidFill>
-                  <a:srgbClr val="171717"/>
-                </a:solidFill>
-                <a:latin typeface="+mn-lt"/>
-                <a:ea typeface="+mn-ea"/>
-                <a:cs typeface="+mn-cs"/>
-                <a:sym typeface="Arial"/>
-              </a:defRPr>
-            </a:pPr>
-            <a:r>
-              <a:t>Make sure there isn’t any litter near your workstation.</a:t>
-            </a:r>
-          </a:p>
-          <a:p>
-            <a:pPr marL="629708" indent="-629708" defTabSz="2438400">
-              <a:lnSpc>
-                <a:spcPct val="115000"/>
-              </a:lnSpc>
-              <a:buSzPct val="100000"/>
-              <a:buAutoNum type="arabicPeriod" startAt="1"/>
-              <a:defRPr sz="1800">
-                <a:solidFill>
-                  <a:srgbClr val="171717"/>
-                </a:solidFill>
-                <a:latin typeface="+mn-lt"/>
-                <a:ea typeface="+mn-ea"/>
-                <a:cs typeface="+mn-cs"/>
-                <a:sym typeface="Arial"/>
-              </a:defRPr>
-            </a:pPr>
-            <a:r>
-              <a:t>If you borrowed headphones, sign them back in.</a:t>
-            </a:r>
-          </a:p>
-          <a:p>
-            <a:pPr marL="629708" indent="-629708" defTabSz="2438400">
-              <a:lnSpc>
-                <a:spcPct val="115000"/>
-              </a:lnSpc>
-              <a:buSzPct val="100000"/>
-              <a:buAutoNum type="arabicPeriod" startAt="1"/>
-              <a:defRPr b="1" sz="1800">
-                <a:solidFill>
-                  <a:srgbClr val="171717"/>
-                </a:solidFill>
-                <a:latin typeface="+mn-lt"/>
-                <a:ea typeface="+mn-ea"/>
-                <a:cs typeface="+mn-cs"/>
-                <a:sym typeface="Arial"/>
-              </a:defRPr>
-            </a:pPr>
-            <a:r>
-              <a:t>Make sure you are logged out of your computer! </a:t>
-            </a:r>
-          </a:p>
-          <a:p>
-            <a:pPr marL="629708" indent="-629708" defTabSz="2438400">
-              <a:lnSpc>
-                <a:spcPct val="115000"/>
-              </a:lnSpc>
-              <a:buSzPct val="100000"/>
-              <a:buAutoNum type="arabicPeriod" startAt="1"/>
-              <a:defRPr sz="1800">
-                <a:solidFill>
-                  <a:srgbClr val="171717"/>
-                </a:solidFill>
-                <a:latin typeface="+mn-lt"/>
-                <a:ea typeface="+mn-ea"/>
-                <a:cs typeface="+mn-cs"/>
-                <a:sym typeface="Arial"/>
-              </a:defRPr>
-            </a:pPr>
-            <a:r>
-              <a:t>Remain in your seat until the bell rings.</a:t>
-            </a:r>
-          </a:p>
-        </p:txBody>
-      </p:sp>
-      <p:grpSp>
-        <p:nvGrpSpPr>
-          <p:cNvPr id="234" name="Google Shape;118;p19"/>
-          <p:cNvGrpSpPr/>
-          <p:nvPr/>
-        </p:nvGrpSpPr>
-        <p:grpSpPr>
-          <a:xfrm>
-            <a:off x="2147095" y="500360"/>
-            <a:ext cx="6535195" cy="810605"/>
-            <a:chOff x="0" y="0"/>
-            <a:chExt cx="6535193" cy="810604"/>
-          </a:xfrm>
-        </p:grpSpPr>
-        <p:sp>
-          <p:nvSpPr>
-            <p:cNvPr id="232" name="Rectangle"/>
-            <p:cNvSpPr/>
-            <p:nvPr/>
-          </p:nvSpPr>
-          <p:spPr>
-            <a:xfrm>
-              <a:off x="-1" y="-1"/>
-              <a:ext cx="6535195" cy="810606"/>
-            </a:xfrm>
-            <a:prstGeom prst="rect">
-              <a:avLst/>
-            </a:prstGeom>
-            <a:solidFill>
-              <a:srgbClr val="FFFFFF"/>
-            </a:solidFill>
-            <a:ln w="25400" cap="flat">
-              <a:solidFill>
-                <a:schemeClr val="accent1"/>
-              </a:solidFill>
-              <a:prstDash val="solid"/>
-              <a:round/>
-            </a:ln>
-            <a:effectLst/>
-          </p:spPr>
-          <p:txBody>
-            <a:bodyPr wrap="square" lIns="0" tIns="0" rIns="0" bIns="0" numCol="1" anchor="t">
-              <a:noAutofit/>
-            </a:bodyPr>
-            <a:lstStyle/>
-            <a:p>
-              <a:pPr>
-                <a:defRPr>
-                  <a:solidFill>
-                    <a:schemeClr val="accent3">
-                      <a:lumOff val="-9098"/>
-                    </a:schemeClr>
-                  </a:solidFill>
-                </a:defRPr>
-              </a:pPr>
-            </a:p>
-          </p:txBody>
-        </p:sp>
-        <p:sp>
-          <p:nvSpPr>
-            <p:cNvPr id="233" name="wrapping up!…"/>
-            <p:cNvSpPr txBox="1"/>
-            <p:nvPr/>
-          </p:nvSpPr>
-          <p:spPr>
-            <a:xfrm>
-              <a:off x="12699" y="12699"/>
-              <a:ext cx="6509795" cy="785206"/>
-            </a:xfrm>
-            <a:prstGeom prst="rect">
-              <a:avLst/>
-            </a:prstGeom>
-            <a:noFill/>
-            <a:ln w="12700" cap="flat">
-              <a:noFill/>
-              <a:miter lim="400000"/>
-            </a:ln>
-            <a:effectLst/>
-            <a:extLst>
-              <a:ext uri="{C572A759-6A51-4108-AA02-DFA0A04FC94B}">
-                <ma14:wrappingTextBoxFlag xmlns:ma14="http://schemas.microsoft.com/office/mac/drawingml/2011/main" val="1"/>
-              </a:ext>
-            </a:extLst>
-          </p:spPr>
-          <p:txBody>
-            <a:bodyPr wrap="square" lIns="91422" tIns="91422" rIns="91422" bIns="91422" numCol="1" anchor="t">
-              <a:normAutofit fontScale="100000" lnSpcReduction="0"/>
-            </a:bodyPr>
-            <a:lstStyle/>
-            <a:p>
-              <a:pPr>
-                <a:defRPr sz="2400">
-                  <a:latin typeface="+mn-lt"/>
-                  <a:ea typeface="+mn-ea"/>
-                  <a:cs typeface="+mn-cs"/>
-                  <a:sym typeface="Arial"/>
-                </a:defRPr>
-              </a:pPr>
-              <a:r>
-                <a:t>wrapping up!</a:t>
-              </a:r>
-            </a:p>
-            <a:p>
-              <a:pPr>
-                <a:defRPr>
-                  <a:solidFill>
-                    <a:schemeClr val="accent5"/>
-                  </a:solidFill>
-                </a:defRPr>
-              </a:pPr>
-              <a:r>
-                <a:t>be sure to:</a:t>
-              </a:r>
-              <a:r>
-                <a:rPr>
-                  <a:solidFill>
-                    <a:schemeClr val="accent5">
-                      <a:lumOff val="-9843"/>
-                    </a:schemeClr>
-                  </a:solidFill>
-                </a:rPr>
-                <a:t> </a:t>
-              </a:r>
-              <a:r>
-                <a:rPr>
-                  <a:solidFill>
-                    <a:schemeClr val="accent1"/>
-                  </a:solidFill>
-                </a:rPr>
-                <a:t>read the directions below!</a:t>
-              </a:r>
-            </a:p>
-          </p:txBody>
-        </p:sp>
-      </p:grpSp>
-      <p:pic>
-        <p:nvPicPr>
-          <p:cNvPr id="235" name="Image" descr="Image"/>
-          <p:cNvPicPr>
-            <a:picLocks noChangeAspect="1"/>
-          </p:cNvPicPr>
-          <p:nvPr/>
-        </p:nvPicPr>
-        <p:blipFill>
-          <a:blip r:embed="rId2">
-            <a:extLst/>
-          </a:blip>
-          <a:stretch>
-            <a:fillRect/>
-          </a:stretch>
-        </p:blipFill>
-        <p:spPr>
-          <a:xfrm>
-            <a:off x="281021" y="1497170"/>
-            <a:ext cx="2126173" cy="1811185"/>
-          </a:xfrm>
-          <a:prstGeom prst="rect">
-            <a:avLst/>
-          </a:prstGeom>
-          <a:ln w="12700">
-            <a:miter lim="400000"/>
-          </a:ln>
-        </p:spPr>
-      </p:pic>
-    </p:spTree>
-  </p:cSld>
-  <p:clrMapOvr>
-    <a:masterClrMapping/>
-  </p:clrMapOvr>
-  <p:transition xmlns:p14="http://schemas.microsoft.com/office/powerpoint/2010/main" spd="med" advClick="1"/>
-</p:sld>
-</file>
-
 <file path=ppt/slides/slide2.xml><?xml version="1.0" encoding="utf-8"?>
 <p:sld xmlns:a="http://schemas.openxmlformats.org/drawingml/2006/main" xmlns:r="http://schemas.openxmlformats.org/officeDocument/2006/relationships" xmlns:p="http://schemas.openxmlformats.org/presentationml/2006/main" xmlns:m="http://schemas.openxmlformats.org/officeDocument/2006/math" xmlns:a14="http://schemas.microsoft.com/office/drawing/2010/main" showMasterSp="1" showMasterPhAnim="1">
   <p:cSld>
@@ -6007,8 +5548,8 @@
         </p:nvSpPr>
         <p:spPr>
           <a:xfrm>
-            <a:off x="880266" y="2319579"/>
-            <a:ext cx="5148087" cy="1607799"/>
+            <a:off x="880266" y="2319578"/>
+            <a:ext cx="5148087" cy="1607800"/>
           </a:xfrm>
           <a:prstGeom prst="rect">
             <a:avLst/>
@@ -6395,8 +5936,8 @@
         </p:nvSpPr>
         <p:spPr>
           <a:xfrm>
-            <a:off x="6276494" y="2319579"/>
-            <a:ext cx="1940621" cy="1300885"/>
+            <a:off x="6276494" y="2319578"/>
+            <a:ext cx="1940621" cy="1300886"/>
           </a:xfrm>
           <a:prstGeom prst="rect">
             <a:avLst/>
@@ -8451,76 +7992,14 @@
       </p:grpSpPr>
       <p:sp>
         <p:nvSpPr>
-          <p:cNvPr id="215" name="Problem (1d)"/>
-          <p:cNvSpPr txBox="1"/>
-          <p:nvPr>
-            <p:ph type="title"/>
-          </p:nvPr>
-        </p:nvSpPr>
-        <p:spPr>
-          <a:xfrm>
-            <a:off x="1899971" y="411575"/>
-            <a:ext cx="6923930" cy="609043"/>
-          </a:xfrm>
-          <a:prstGeom prst="rect">
-            <a:avLst/>
-          </a:prstGeom>
-        </p:spPr>
-        <p:txBody>
-          <a:bodyPr/>
-          <a:lstStyle>
-            <a:lvl1pPr defTabSz="850391">
-              <a:defRPr sz="2790"/>
-            </a:lvl1pPr>
-          </a:lstStyle>
-          <a:p>
-            <a:pPr/>
-            <a:r>
-              <a:t>Problem (1d)</a:t>
-            </a:r>
-          </a:p>
-        </p:txBody>
-      </p:sp>
-      <p:pic>
-        <p:nvPicPr>
-          <p:cNvPr id="216" name="IMG_0111.png" descr="IMG_0111.png"/>
-          <p:cNvPicPr>
-            <a:picLocks noChangeAspect="1"/>
-          </p:cNvPicPr>
-          <p:nvPr/>
-        </p:nvPicPr>
-        <p:blipFill>
-          <a:blip r:embed="rId3">
-            <a:extLst/>
-          </a:blip>
-          <a:srcRect l="24881" t="64312" r="22873" b="24205"/>
-          <a:stretch>
-            <a:fillRect/>
-          </a:stretch>
-        </p:blipFill>
-        <p:spPr>
-          <a:xfrm>
-            <a:off x="2027717" y="1699149"/>
-            <a:ext cx="4489971" cy="1315595"/>
-          </a:xfrm>
-          <a:prstGeom prst="rect">
-            <a:avLst/>
-          </a:prstGeom>
-          <a:ln w="12700">
-            <a:miter lim="400000"/>
-          </a:ln>
-        </p:spPr>
-      </p:pic>
-      <p:sp>
-        <p:nvSpPr>
-          <p:cNvPr id="217" name="Identity matrix…"/>
+          <p:cNvPr id="215" name="Google Shape;119;p19"/>
           <p:cNvSpPr txBox="1"/>
           <p:nvPr/>
         </p:nvSpPr>
         <p:spPr>
           <a:xfrm>
-            <a:off x="2732066" y="3333219"/>
-            <a:ext cx="3486663" cy="1106714"/>
+            <a:off x="2463308" y="1404067"/>
+            <a:ext cx="10603771" cy="2452971"/>
           </a:xfrm>
           <a:prstGeom prst="rect">
             <a:avLst/>
@@ -8535,275 +8014,251 @@
           </a:extLst>
         </p:spPr>
         <p:txBody>
-          <a:bodyPr lIns="0" tIns="0" rIns="0" bIns="0">
-            <a:spAutoFit/>
+          <a:bodyPr lIns="243799" tIns="243799" rIns="243799" bIns="243799">
+            <a:normAutofit fontScale="100000" lnSpcReduction="0"/>
           </a:bodyPr>
           <a:lstStyle/>
           <a:p>
-            <a:pPr>
-              <a:defRPr>
+            <a:pPr marL="629708" indent="-629708" defTabSz="2438400">
+              <a:lnSpc>
+                <a:spcPct val="115000"/>
+              </a:lnSpc>
+              <a:buSzPct val="100000"/>
+              <a:buAutoNum type="arabicPeriod" startAt="1"/>
+              <a:defRPr sz="1800">
                 <a:solidFill>
-                  <a:srgbClr val="011D57"/>
+                  <a:srgbClr val="171717"/>
                 </a:solidFill>
+                <a:latin typeface="+mn-lt"/>
+                <a:ea typeface="+mn-ea"/>
+                <a:cs typeface="+mn-cs"/>
+                <a:sym typeface="Arial"/>
               </a:defRPr>
             </a:pPr>
             <a:r>
-              <a:t>Identity matrix</a:t>
-            </a:r>
-          </a:p>
-          <a:p>
-            <a:pPr/>
-            <a:r>
-              <a:t>An </a:t>
-            </a:r>
-            <a14:m>
-              <m:oMath>
-                <m:r>
-                  <a:rPr xmlns:a="http://schemas.openxmlformats.org/drawingml/2006/main" sz="1700" i="1">
-                    <a:solidFill>
-                      <a:srgbClr val="F46524"/>
-                    </a:solidFill>
-                    <a:latin typeface="Cambria Math" panose="02040503050406030204" pitchFamily="18" charset="0"/>
-                  </a:rPr>
-                  <m:t>n</m:t>
-                </m:r>
-                <m:r>
-                  <a:rPr xmlns:a="http://schemas.openxmlformats.org/drawingml/2006/main" sz="1700" i="1">
-                    <a:solidFill>
-                      <a:srgbClr val="F46524"/>
-                    </a:solidFill>
-                    <a:latin typeface="Cambria Math" panose="02040503050406030204" pitchFamily="18" charset="0"/>
-                  </a:rPr>
-                  <m:t>×</m:t>
-                </m:r>
-                <m:r>
-                  <a:rPr xmlns:a="http://schemas.openxmlformats.org/drawingml/2006/main" sz="1700" i="1">
-                    <a:solidFill>
-                      <a:srgbClr val="F46524"/>
-                    </a:solidFill>
-                    <a:latin typeface="Cambria Math" panose="02040503050406030204" pitchFamily="18" charset="0"/>
-                  </a:rPr>
-                  <m:t>n</m:t>
-                </m:r>
-              </m:oMath>
-            </a14:m>
-            <a:r>
-              <a:t> matrix with 1s on its main diagonal and zeros everywhere else.  Denoted by </a:t>
-            </a:r>
-            <a14:m>
-              <m:oMath>
-                <m:r>
-                  <a:rPr xmlns:a="http://schemas.openxmlformats.org/drawingml/2006/main" sz="1450" i="1">
-                    <a:solidFill>
-                      <a:srgbClr val="F46524"/>
-                    </a:solidFill>
-                    <a:latin typeface="Cambria Math" panose="02040503050406030204" pitchFamily="18" charset="0"/>
-                  </a:rPr>
-                  <m:t>I</m:t>
-                </m:r>
-              </m:oMath>
-            </a14:m>
-            <a:r>
-              <a:t>. Multiplying any compatible matrix </a:t>
-            </a:r>
-            <a14:m>
-              <m:oMath>
-                <m:r>
-                  <a:rPr xmlns:a="http://schemas.openxmlformats.org/drawingml/2006/main" sz="1650" i="1">
-                    <a:solidFill>
-                      <a:srgbClr val="F46524"/>
-                    </a:solidFill>
-                    <a:latin typeface="Cambria Math" panose="02040503050406030204" pitchFamily="18" charset="0"/>
-                  </a:rPr>
-                  <m:t>A</m:t>
-                </m:r>
-              </m:oMath>
-            </a14:m>
-            <a:r>
-              <a:t> by </a:t>
-            </a:r>
-            <a14:m>
-              <m:oMath>
-                <m:r>
-                  <a:rPr xmlns:a="http://schemas.openxmlformats.org/drawingml/2006/main" sz="1450" i="1">
-                    <a:solidFill>
-                      <a:srgbClr val="F46524"/>
-                    </a:solidFill>
-                    <a:latin typeface="Cambria Math" panose="02040503050406030204" pitchFamily="18" charset="0"/>
-                  </a:rPr>
-                  <m:t>I</m:t>
-                </m:r>
-              </m:oMath>
-            </a14:m>
-            <a:r>
-              <a:t> results in the original matrix </a:t>
-            </a:r>
-            <a:r>
-              <a:rPr i="1"/>
-              <a:t>A</a:t>
-            </a:r>
-            <a:r>
-              <a:t>.</a:t>
+              <a:t>Make sure there isn’t any litter near your workstation.</a:t>
+            </a:r>
+          </a:p>
+          <a:p>
+            <a:pPr marL="629708" indent="-629708" defTabSz="2438400">
+              <a:lnSpc>
+                <a:spcPct val="115000"/>
+              </a:lnSpc>
+              <a:buSzPct val="100000"/>
+              <a:buAutoNum type="arabicPeriod" startAt="1"/>
+              <a:defRPr sz="1800">
+                <a:solidFill>
+                  <a:srgbClr val="171717"/>
+                </a:solidFill>
+                <a:latin typeface="+mn-lt"/>
+                <a:ea typeface="+mn-ea"/>
+                <a:cs typeface="+mn-cs"/>
+                <a:sym typeface="Arial"/>
+              </a:defRPr>
+            </a:pPr>
+            <a:r>
+              <a:t>If you borrowed headphones, sign them back in.</a:t>
+            </a:r>
+          </a:p>
+          <a:p>
+            <a:pPr marL="629708" indent="-629708" defTabSz="2438400">
+              <a:lnSpc>
+                <a:spcPct val="115000"/>
+              </a:lnSpc>
+              <a:buSzPct val="100000"/>
+              <a:buAutoNum type="arabicPeriod" startAt="1"/>
+              <a:defRPr b="1" sz="1800">
+                <a:solidFill>
+                  <a:srgbClr val="171717"/>
+                </a:solidFill>
+                <a:latin typeface="+mn-lt"/>
+                <a:ea typeface="+mn-ea"/>
+                <a:cs typeface="+mn-cs"/>
+                <a:sym typeface="Arial"/>
+              </a:defRPr>
+            </a:pPr>
+            <a:r>
+              <a:t>Make sure you are logged out of your computer! </a:t>
+            </a:r>
+          </a:p>
+          <a:p>
+            <a:pPr marL="629708" indent="-629708" defTabSz="2438400">
+              <a:lnSpc>
+                <a:spcPct val="115000"/>
+              </a:lnSpc>
+              <a:buSzPct val="100000"/>
+              <a:buAutoNum type="arabicPeriod" startAt="1"/>
+              <a:defRPr sz="1800">
+                <a:solidFill>
+                  <a:srgbClr val="171717"/>
+                </a:solidFill>
+                <a:latin typeface="+mn-lt"/>
+                <a:ea typeface="+mn-ea"/>
+                <a:cs typeface="+mn-cs"/>
+                <a:sym typeface="Arial"/>
+              </a:defRPr>
+            </a:pPr>
+            <a:r>
+              <a:t>Remain in your seat until the bell rings.</a:t>
             </a:r>
           </a:p>
         </p:txBody>
       </p:sp>
-    </p:spTree>
-  </p:cSld>
-  <p:clrMapOvr>
-    <a:masterClrMapping/>
-  </p:clrMapOvr>
-  <p:transition xmlns:p14="http://schemas.microsoft.com/office/powerpoint/2010/main" spd="med" advClick="1"/>
-  <p:timing>
-    <p:tnLst>
-      <p:par>
-        <p:cTn id="1" nodeType="tmRoot" restart="never" dur="indefinite" fill="hold">
-          <p:childTnLst>
-            <p:seq concurrent="1" prevAc="none" nextAc="seek">
-              <p:cTn id="2" nodeType="mainSeq" dur="indefinite" fill="hold">
-                <p:childTnLst>
-                  <p:par>
-                    <p:cTn id="3" fill="hold">
-                      <p:stCondLst>
-                        <p:cond delay="indefinite"/>
-                      </p:stCondLst>
-                      <p:childTnLst>
-                        <p:par>
-                          <p:cTn id="4" fill="hold">
-                            <p:stCondLst>
-                              <p:cond delay="0"/>
-                            </p:stCondLst>
-                            <p:childTnLst>
-                              <p:par>
-                                <p:cTn id="5" presetClass="entr" nodeType="clickEffect" presetSubtype="0" presetID="1" grpId="1" fill="hold">
-                                  <p:stCondLst>
-                                    <p:cond delay="0"/>
-                                  </p:stCondLst>
-                                  <p:iterate type="el" backwards="0">
-                                    <p:tmAbs val="0"/>
-                                  </p:iterate>
-                                  <p:childTnLst>
-                                    <p:set>
-                                      <p:cBhvr>
-                                        <p:cTn id="6" fill="hold"/>
-                                        <p:tgtEl>
-                                          <p:spTgt spid="217"/>
-                                        </p:tgtEl>
-                                        <p:attrNameLst>
-                                          <p:attrName>style.visibility</p:attrName>
-                                        </p:attrNameLst>
-                                      </p:cBhvr>
-                                      <p:to>
-                                        <p:strVal val="visible"/>
-                                      </p:to>
-                                    </p:set>
-                                  </p:childTnLst>
-                                </p:cTn>
-                              </p:par>
-                            </p:childTnLst>
-                          </p:cTn>
-                        </p:par>
-                      </p:childTnLst>
-                    </p:cTn>
-                  </p:par>
-                </p:childTnLst>
-              </p:cTn>
-              <p:prevCondLst>
-                <p:cond evt="onPrev">
-                  <p:tgtEl>
-                    <p:sldTgt/>
-                  </p:tgtEl>
-                </p:cond>
-              </p:prevCondLst>
-              <p:nextCondLst>
-                <p:cond evt="onNext">
-                  <p:tgtEl>
-                    <p:sldTgt/>
-                  </p:tgtEl>
-                </p:cond>
-              </p:nextCondLst>
-            </p:seq>
-          </p:childTnLst>
-        </p:cTn>
-      </p:par>
-    </p:tnLst>
-    <p:bldLst>
-      <p:bldP build="whole" bldLvl="1" animBg="1" rev="0" advAuto="0" spid="217" grpId="1"/>
-    </p:bldLst>
-  </p:timing>
-</p:sld>
-</file>
-
-<file path=ppt/slides/slide8.xml><?xml version="1.0" encoding="utf-8"?>
-<p:sld xmlns:a="http://schemas.openxmlformats.org/drawingml/2006/main" xmlns:r="http://schemas.openxmlformats.org/officeDocument/2006/relationships" xmlns:p="http://schemas.openxmlformats.org/presentationml/2006/main" xmlns:m="http://schemas.openxmlformats.org/officeDocument/2006/math" xmlns:a14="http://schemas.microsoft.com/office/drawing/2010/main" showMasterSp="1" showMasterPhAnim="1">
-  <p:cSld>
-    <p:spTree>
-      <p:nvGrpSpPr>
-        <p:cNvPr id="1" name=""/>
-        <p:cNvGrpSpPr/>
-        <p:nvPr/>
-      </p:nvGrpSpPr>
-      <p:grpSpPr>
-        <a:xfrm>
-          <a:off x="0" y="0"/>
-          <a:ext cx="0" cy="0"/>
-          <a:chOff x="0" y="0"/>
-          <a:chExt cx="0" cy="0"/>
-        </a:xfrm>
-      </p:grpSpPr>
-      <p:sp>
-        <p:nvSpPr>
-          <p:cNvPr id="221" name="Problem (2b)"/>
-          <p:cNvSpPr txBox="1"/>
-          <p:nvPr>
-            <p:ph type="title"/>
-          </p:nvPr>
-        </p:nvSpPr>
-        <p:spPr>
+      <p:grpSp>
+        <p:nvGrpSpPr>
+          <p:cNvPr id="218" name="Google Shape;118;p19"/>
+          <p:cNvGrpSpPr/>
+          <p:nvPr/>
+        </p:nvGrpSpPr>
+        <p:grpSpPr>
           <a:xfrm>
-            <a:off x="1694815" y="411575"/>
-            <a:ext cx="7129086" cy="535147"/>
+            <a:off x="2147095" y="500360"/>
+            <a:ext cx="6535195" cy="810605"/>
+            <a:chOff x="0" y="0"/>
+            <a:chExt cx="6535193" cy="810604"/>
           </a:xfrm>
-          <a:prstGeom prst="rect">
-            <a:avLst/>
-          </a:prstGeom>
-        </p:spPr>
-        <p:txBody>
-          <a:bodyPr/>
-          <a:lstStyle>
-            <a:lvl1pPr defTabSz="685800">
-              <a:defRPr sz="2250"/>
-            </a:lvl1pPr>
-          </a:lstStyle>
-          <a:p>
-            <a:pPr/>
-            <a:r>
-              <a:t>Problem (2b)</a:t>
-            </a:r>
-          </a:p>
-        </p:txBody>
-      </p:sp>
+        </p:grpSpPr>
+        <p:sp>
+          <p:nvSpPr>
+            <p:cNvPr id="216" name="Rectangle"/>
+            <p:cNvSpPr/>
+            <p:nvPr/>
+          </p:nvSpPr>
+          <p:spPr>
+            <a:xfrm>
+              <a:off x="-1" y="-1"/>
+              <a:ext cx="6535195" cy="810606"/>
+            </a:xfrm>
+            <a:prstGeom prst="rect">
+              <a:avLst/>
+            </a:prstGeom>
+            <a:solidFill>
+              <a:srgbClr val="FFFFFF"/>
+            </a:solidFill>
+            <a:ln w="25400" cap="flat">
+              <a:solidFill>
+                <a:schemeClr val="accent1"/>
+              </a:solidFill>
+              <a:prstDash val="solid"/>
+              <a:round/>
+            </a:ln>
+            <a:effectLst/>
+          </p:spPr>
+          <p:txBody>
+            <a:bodyPr wrap="square" lIns="0" tIns="0" rIns="0" bIns="0" numCol="1" anchor="t">
+              <a:noAutofit/>
+            </a:bodyPr>
+            <a:lstStyle/>
+            <a:p>
+              <a:pPr>
+                <a:defRPr>
+                  <a:solidFill>
+                    <a:schemeClr val="accent3">
+                      <a:lumOff val="-9098"/>
+                    </a:schemeClr>
+                  </a:solidFill>
+                </a:defRPr>
+              </a:pPr>
+            </a:p>
+          </p:txBody>
+        </p:sp>
+        <p:sp>
+          <p:nvSpPr>
+            <p:cNvPr id="217" name="wrapping up!…"/>
+            <p:cNvSpPr txBox="1"/>
+            <p:nvPr/>
+          </p:nvSpPr>
+          <p:spPr>
+            <a:xfrm>
+              <a:off x="12699" y="12699"/>
+              <a:ext cx="6509795" cy="785206"/>
+            </a:xfrm>
+            <a:prstGeom prst="rect">
+              <a:avLst/>
+            </a:prstGeom>
+            <a:noFill/>
+            <a:ln w="12700" cap="flat">
+              <a:noFill/>
+              <a:miter lim="400000"/>
+            </a:ln>
+            <a:effectLst/>
+            <a:extLst>
+              <a:ext uri="{C572A759-6A51-4108-AA02-DFA0A04FC94B}">
+                <ma14:wrappingTextBoxFlag xmlns:ma14="http://schemas.microsoft.com/office/mac/drawingml/2011/main" val="1"/>
+              </a:ext>
+            </a:extLst>
+          </p:spPr>
+          <p:txBody>
+            <a:bodyPr wrap="square" lIns="91422" tIns="91422" rIns="91422" bIns="91422" numCol="1" anchor="t">
+              <a:normAutofit fontScale="100000" lnSpcReduction="0"/>
+            </a:bodyPr>
+            <a:lstStyle/>
+            <a:p>
+              <a:pPr>
+                <a:defRPr sz="2400">
+                  <a:latin typeface="+mn-lt"/>
+                  <a:ea typeface="+mn-ea"/>
+                  <a:cs typeface="+mn-cs"/>
+                  <a:sym typeface="Arial"/>
+                </a:defRPr>
+              </a:pPr>
+              <a:r>
+                <a:t>wrapping up!</a:t>
+              </a:r>
+            </a:p>
+            <a:p>
+              <a:pPr>
+                <a:defRPr>
+                  <a:solidFill>
+                    <a:schemeClr val="accent5"/>
+                  </a:solidFill>
+                </a:defRPr>
+              </a:pPr>
+              <a:r>
+                <a:t>be sure to:</a:t>
+              </a:r>
+              <a:r>
+                <a:rPr>
+                  <a:solidFill>
+                    <a:schemeClr val="accent5">
+                      <a:lumOff val="-9843"/>
+                    </a:schemeClr>
+                  </a:solidFill>
+                </a:rPr>
+                <a:t> </a:t>
+              </a:r>
+              <a:r>
+                <a:rPr>
+                  <a:solidFill>
+                    <a:schemeClr val="accent1"/>
+                  </a:solidFill>
+                </a:rPr>
+                <a:t>read the directions below!</a:t>
+              </a:r>
+            </a:p>
+          </p:txBody>
+        </p:sp>
+      </p:grpSp>
       <p:pic>
         <p:nvPicPr>
-          <p:cNvPr id="222" name="IMG_0112.png" descr="IMG_0112.png"/>
+          <p:cNvPr id="219" name="Image" descr="Image"/>
           <p:cNvPicPr>
             <a:picLocks noChangeAspect="1"/>
           </p:cNvPicPr>
           <p:nvPr/>
         </p:nvPicPr>
         <p:blipFill>
-          <a:blip r:embed="rId3">
+          <a:blip r:embed="rId2">
             <a:extLst/>
           </a:blip>
-          <a:srcRect l="19670" t="50333" r="8331" b="38878"/>
           <a:stretch>
             <a:fillRect/>
           </a:stretch>
         </p:blipFill>
         <p:spPr>
           <a:xfrm>
-            <a:off x="1169485" y="2204706"/>
-            <a:ext cx="6041128" cy="1206902"/>
+            <a:off x="281021" y="1497170"/>
+            <a:ext cx="2126173" cy="1811185"/>
           </a:xfrm>
           <a:prstGeom prst="rect">
             <a:avLst/>
@@ -8813,228 +8268,6 @@
           </a:ln>
         </p:spPr>
       </p:pic>
-      <p:sp>
-        <p:nvSpPr>
-          <p:cNvPr id="223" name="Why is the matrix equation below equivalent to the system of linear equations?"/>
-          <p:cNvSpPr txBox="1"/>
-          <p:nvPr/>
-        </p:nvSpPr>
-        <p:spPr>
-          <a:xfrm>
-            <a:off x="1821484" y="1467763"/>
-            <a:ext cx="4928831" cy="431801"/>
-          </a:xfrm>
-          <a:prstGeom prst="rect">
-            <a:avLst/>
-          </a:prstGeom>
-          <a:ln w="12700">
-            <a:miter lim="400000"/>
-          </a:ln>
-          <a:extLst>
-            <a:ext uri="{C572A759-6A51-4108-AA02-DFA0A04FC94B}">
-              <ma14:wrappingTextBoxFlag xmlns:ma14="http://schemas.microsoft.com/office/mac/drawingml/2011/main" val="1"/>
-            </a:ext>
-          </a:extLst>
-        </p:spPr>
-        <p:txBody>
-          <a:bodyPr lIns="0" tIns="0" rIns="0" bIns="0">
-            <a:spAutoFit/>
-          </a:bodyPr>
-          <a:lstStyle/>
-          <a:p>
-            <a:pPr/>
-            <a:r>
-              <a:t>Why is the matrix equation below equivalent to the system of linear equations?</a:t>
-            </a:r>
-          </a:p>
-        </p:txBody>
-      </p:sp>
-    </p:spTree>
-  </p:cSld>
-  <p:clrMapOvr>
-    <a:masterClrMapping/>
-  </p:clrMapOvr>
-  <p:transition xmlns:p14="http://schemas.microsoft.com/office/powerpoint/2010/main" spd="med" advClick="1"/>
-</p:sld>
-</file>
-
-<file path=ppt/slides/slide9.xml><?xml version="1.0" encoding="utf-8"?>
-<p:sld xmlns:a="http://schemas.openxmlformats.org/drawingml/2006/main" xmlns:r="http://schemas.openxmlformats.org/officeDocument/2006/relationships" xmlns:p="http://schemas.openxmlformats.org/presentationml/2006/main" xmlns:m="http://schemas.openxmlformats.org/officeDocument/2006/math" xmlns:a14="http://schemas.microsoft.com/office/drawing/2010/main" showMasterSp="1" showMasterPhAnim="1">
-  <p:cSld>
-    <p:spTree>
-      <p:nvGrpSpPr>
-        <p:cNvPr id="1" name=""/>
-        <p:cNvGrpSpPr/>
-        <p:nvPr/>
-      </p:nvGrpSpPr>
-      <p:grpSpPr>
-        <a:xfrm>
-          <a:off x="0" y="0"/>
-          <a:ext cx="0" cy="0"/>
-          <a:chOff x="0" y="0"/>
-          <a:chExt cx="0" cy="0"/>
-        </a:xfrm>
-      </p:grpSpPr>
-      <p:sp>
-        <p:nvSpPr>
-          <p:cNvPr id="227" name="Reflection"/>
-          <p:cNvSpPr txBox="1"/>
-          <p:nvPr>
-            <p:ph type="title"/>
-          </p:nvPr>
-        </p:nvSpPr>
-        <p:spPr>
-          <a:xfrm>
-            <a:off x="1940507" y="411575"/>
-            <a:ext cx="6883394" cy="639602"/>
-          </a:xfrm>
-          <a:prstGeom prst="rect">
-            <a:avLst/>
-          </a:prstGeom>
-        </p:spPr>
-        <p:txBody>
-          <a:bodyPr/>
-          <a:lstStyle>
-            <a:lvl1pPr defTabSz="886968">
-              <a:defRPr sz="2910"/>
-            </a:lvl1pPr>
-          </a:lstStyle>
-          <a:p>
-            <a:pPr/>
-            <a:r>
-              <a:t>Reflection</a:t>
-            </a:r>
-          </a:p>
-        </p:txBody>
-      </p:sp>
-      <p:sp>
-        <p:nvSpPr>
-          <p:cNvPr id="228" name="Reflection:…"/>
-          <p:cNvSpPr txBox="1"/>
-          <p:nvPr/>
-        </p:nvSpPr>
-        <p:spPr>
-          <a:xfrm>
-            <a:off x="1315567" y="357128"/>
-            <a:ext cx="7302728" cy="939692"/>
-          </a:xfrm>
-          <a:prstGeom prst="rect">
-            <a:avLst/>
-          </a:prstGeom>
-          <a:solidFill>
-            <a:srgbClr val="FFFFFF"/>
-          </a:solidFill>
-          <a:ln w="25400">
-            <a:solidFill>
-              <a:schemeClr val="accent1"/>
-            </a:solidFill>
-          </a:ln>
-          <a:extLst>
-            <a:ext uri="{C572A759-6A51-4108-AA02-DFA0A04FC94B}">
-              <ma14:wrappingTextBoxFlag xmlns:ma14="http://schemas.microsoft.com/office/mac/drawingml/2011/main" val="1"/>
-            </a:ext>
-          </a:extLst>
-        </p:spPr>
-        <p:txBody>
-          <a:bodyPr lIns="91421" tIns="91421" rIns="91421" bIns="91421">
-            <a:normAutofit fontScale="100000" lnSpcReduction="0"/>
-          </a:bodyPr>
-          <a:lstStyle/>
-          <a:p>
-            <a:pPr defTabSz="813816">
-              <a:defRPr sz="2100">
-                <a:latin typeface="+mn-lt"/>
-                <a:ea typeface="+mn-ea"/>
-                <a:cs typeface="+mn-cs"/>
-                <a:sym typeface="Arial"/>
-              </a:defRPr>
-            </a:pPr>
-            <a:r>
-              <a:t>Reflection:</a:t>
-            </a:r>
-          </a:p>
-          <a:p>
-            <a:pPr defTabSz="813816">
-              <a:defRPr sz="1200">
-                <a:solidFill>
-                  <a:schemeClr val="accent5"/>
-                </a:solidFill>
-              </a:defRPr>
-            </a:pPr>
-            <a:r>
-              <a:t>be sure to:</a:t>
-            </a:r>
-            <a:r>
-              <a:rPr>
-                <a:solidFill>
-                  <a:schemeClr val="accent5">
-                    <a:lumOff val="-9843"/>
-                  </a:schemeClr>
-                </a:solidFill>
-              </a:rPr>
-              <a:t> </a:t>
-            </a:r>
-            <a:r>
-              <a:rPr>
-                <a:solidFill>
-                  <a:schemeClr val="accent3">
-                    <a:lumOff val="-9098"/>
-                  </a:schemeClr>
-                </a:solidFill>
-              </a:rPr>
-              <a:t>Answer each question below with a complete sentence. Be prepared to share out!</a:t>
-            </a:r>
-          </a:p>
-        </p:txBody>
-      </p:sp>
-      <p:sp>
-        <p:nvSpPr>
-          <p:cNvPr id="229" name="How is matrix multiplication similar to matrix addition? How is it different?…"/>
-          <p:cNvSpPr txBox="1"/>
-          <p:nvPr/>
-        </p:nvSpPr>
-        <p:spPr>
-          <a:xfrm>
-            <a:off x="1449858" y="2044700"/>
-            <a:ext cx="5991667" cy="431800"/>
-          </a:xfrm>
-          <a:prstGeom prst="rect">
-            <a:avLst/>
-          </a:prstGeom>
-          <a:ln w="12700">
-            <a:miter lim="400000"/>
-          </a:ln>
-          <a:extLst>
-            <a:ext uri="{C572A759-6A51-4108-AA02-DFA0A04FC94B}">
-              <ma14:wrappingTextBoxFlag xmlns:ma14="http://schemas.microsoft.com/office/mac/drawingml/2011/main" val="1"/>
-            </a:ext>
-          </a:extLst>
-        </p:spPr>
-        <p:txBody>
-          <a:bodyPr lIns="0" tIns="0" rIns="0" bIns="0">
-            <a:spAutoFit/>
-          </a:bodyPr>
-          <a:lstStyle/>
-          <a:p>
-            <a:pPr marL="187157" indent="-187157">
-              <a:buSzPct val="100000"/>
-              <a:buAutoNum type="arabicPeriod" startAt="1"/>
-            </a:pPr>
-            <a:r>
-              <a:t>How is matrix multiplication similar to matrix addition? How is it different?</a:t>
-            </a:r>
-          </a:p>
-          <a:p>
-            <a:pPr marL="187157" indent="-187157">
-              <a:buSzPct val="100000"/>
-              <a:buAutoNum type="arabicPeriod" startAt="1"/>
-            </a:pPr>
-            <a:r>
-              <a:t>Why do you think matrix multiplication is defined the way it is?</a:t>
-            </a:r>
-          </a:p>
-        </p:txBody>
-      </p:sp>
     </p:spTree>
   </p:cSld>
   <p:clrMapOvr>

</xml_diff>